<commit_message>
fixed typo in the poster
</commit_message>
<xml_diff>
--- a/ProjectLightDesignConcept.pptx
+++ b/ProjectLightDesignConcept.pptx
@@ -1446,7 +1446,7 @@
         <a:p>
           <a:r>
             <a:rPr lang="en-US" sz="800" dirty="0"/>
-            <a:t>Qualitative survey of teachers, students, school administrators by Citizen science volunteers</a:t>
+            <a:t>Quantitative survey of teachers, students, school administrators by Citizen science volunteers</a:t>
           </a:r>
         </a:p>
       </dgm:t>
@@ -1482,7 +1482,7 @@
         <a:p>
           <a:r>
             <a:rPr lang="en-US" sz="800" dirty="0"/>
-            <a:t>Program Lead coordinates survey, analysis and experimentation funding activities for a region</a:t>
+            <a:t>Program Lead coordinates survey, analysis and funding for a region</a:t>
           </a:r>
         </a:p>
       </dgm:t>
@@ -1626,7 +1626,7 @@
         <a:p>
           <a:r>
             <a:rPr lang="en-US" sz="800" dirty="0"/>
-            <a:t>Program Lead coordinates survey, analysis and experimentation funding activities for a region</a:t>
+            <a:t>Program Lead coordinates experimentation and funding activities for a region</a:t>
           </a:r>
         </a:p>
       </dgm:t>
@@ -1689,6 +1689,28 @@
         </a:p>
       </dgm:t>
     </dgm:pt>
+    <dgm:pt modelId="{52D4706D-3A0A-43F5-9E47-5EF793ED9237}">
+      <dgm:prSet phldrT="[Text]" custT="1"/>
+      <dgm:spPr/>
+      <dgm:t>
+        <a:bodyPr/>
+        <a:lstStyle/>
+        <a:p>
+          <a:r>
+            <a:rPr lang="en-US" sz="800" dirty="0"/>
+            <a:t>Run A/B experiment on multiple schools changing one of the factors such as toilet availability </a:t>
+          </a:r>
+        </a:p>
+      </dgm:t>
+    </dgm:pt>
+    <dgm:pt modelId="{B7B27AC5-C29B-49F8-AE8C-9A3BDC659FB7}" type="parTrans" cxnId="{4C23EC7F-C6CB-4CB6-A3F1-A3EDE6BEFDB5}">
+      <dgm:prSet/>
+      <dgm:spPr/>
+    </dgm:pt>
+    <dgm:pt modelId="{A4E865A7-4007-4C99-996C-9B655B5C73FD}" type="sibTrans" cxnId="{4C23EC7F-C6CB-4CB6-A3F1-A3EDE6BEFDB5}">
+      <dgm:prSet/>
+      <dgm:spPr/>
+    </dgm:pt>
     <dgm:pt modelId="{6B3EDA9E-0592-4E80-B4BE-DC616318B899}" type="pres">
       <dgm:prSet presAssocID="{BB43531C-B7AE-4292-8377-3162933DAFBA}" presName="Name0" presStyleCnt="0">
         <dgm:presLayoutVars>
@@ -1740,7 +1762,7 @@
     </dgm:pt>
   </dgm:ptLst>
   <dgm:cxnLst>
-    <dgm:cxn modelId="{CA8DC900-E7DC-4D3F-B55E-74DE0564DBA3}" srcId="{7290AEC5-FAB8-4940-8DD7-508E775CDCAA}" destId="{C3BDA8CC-8EFB-409C-BABB-7E444545CE7F}" srcOrd="1" destOrd="0" parTransId="{54E1A982-416E-4C73-8CC7-9A0F2450B31E}" sibTransId="{9F55EC4C-D7C1-45E9-8422-16428357D0F1}"/>
+    <dgm:cxn modelId="{CA8DC900-E7DC-4D3F-B55E-74DE0564DBA3}" srcId="{7290AEC5-FAB8-4940-8DD7-508E775CDCAA}" destId="{C3BDA8CC-8EFB-409C-BABB-7E444545CE7F}" srcOrd="2" destOrd="0" parTransId="{54E1A982-416E-4C73-8CC7-9A0F2450B31E}" sibTransId="{9F55EC4C-D7C1-45E9-8422-16428357D0F1}"/>
     <dgm:cxn modelId="{EB492B05-C6C0-4493-AABB-1094C015CB0C}" type="presOf" srcId="{5377E367-273E-4795-941F-416B9350588C}" destId="{947E9CA5-B5DD-45AE-9C7E-69C5B5579D69}" srcOrd="0" destOrd="4" presId="urn:microsoft.com/office/officeart/2005/8/layout/cycle3"/>
     <dgm:cxn modelId="{47855E07-F600-4DD4-8A7F-6B64BC387EAF}" srcId="{348800AA-BF93-4470-A735-73956D24AE18}" destId="{535BF6A4-83DC-45F3-A547-54354E6FB181}" srcOrd="2" destOrd="0" parTransId="{7BF31B94-0034-4C55-8829-F100FBB9808F}" sibTransId="{D78A7598-C3AB-4803-B3DE-EFE61C261382}"/>
     <dgm:cxn modelId="{10ACF41D-65D5-4F76-9B58-414EEF9E986B}" srcId="{BB43531C-B7AE-4292-8377-3162933DAFBA}" destId="{73D8CF50-A0CC-427D-B577-5DF2E001B29C}" srcOrd="3" destOrd="0" parTransId="{B3A506C1-C550-454A-85E6-3DCCF2AA9509}" sibTransId="{EE94B3D3-9AEC-4BD1-B137-096AC12052CF}"/>
@@ -1751,10 +1773,12 @@
     <dgm:cxn modelId="{CD3BEB46-39F6-4BD7-8DA5-600BF3C6089B}" type="presOf" srcId="{348800AA-BF93-4470-A735-73956D24AE18}" destId="{33674A71-4C08-4487-96D8-8E592933DE35}" srcOrd="0" destOrd="0" presId="urn:microsoft.com/office/officeart/2005/8/layout/cycle3"/>
     <dgm:cxn modelId="{12B52067-BB2C-4537-B254-E34012975DF7}" srcId="{73D8CF50-A0CC-427D-B577-5DF2E001B29C}" destId="{D3C9EFAB-9817-442E-95E7-F2323EBA5AF0}" srcOrd="1" destOrd="0" parTransId="{D51D88F0-CBD3-4BB0-A762-BA9CCD786151}" sibTransId="{7D1C0C26-F25D-4175-8A7C-BCC8970F1E47}"/>
     <dgm:cxn modelId="{0C0E8B71-852B-49B2-8C00-6D1B798288D0}" type="presOf" srcId="{87A15763-626D-4CD0-9A54-D6C03AE5E0EE}" destId="{33674A71-4C08-4487-96D8-8E592933DE35}" srcOrd="0" destOrd="1" presId="urn:microsoft.com/office/officeart/2005/8/layout/cycle3"/>
+    <dgm:cxn modelId="{252EC653-DE00-46F2-9B7A-343FAD999C14}" type="presOf" srcId="{52D4706D-3A0A-43F5-9E47-5EF793ED9237}" destId="{4CA1D32F-63F3-4A49-BAC9-338CDA266B1B}" srcOrd="0" destOrd="2" presId="urn:microsoft.com/office/officeart/2005/8/layout/cycle3"/>
     <dgm:cxn modelId="{CB555678-CC60-4209-A87F-68108A647C81}" type="presOf" srcId="{1CAC3D3F-F768-4797-B5DC-CB6CF271E5F4}" destId="{33674A71-4C08-4487-96D8-8E592933DE35}" srcOrd="0" destOrd="4" presId="urn:microsoft.com/office/officeart/2005/8/layout/cycle3"/>
     <dgm:cxn modelId="{0A209959-625F-4607-AA8C-219FA06995E5}" srcId="{572591BB-86FD-4B12-B04F-F5C37BC503F7}" destId="{E1DBEAA1-1931-4A3B-B55B-BF97366FF0F6}" srcOrd="2" destOrd="0" parTransId="{A0823812-CE0B-4C56-AF0D-6DEE81A6F31D}" sibTransId="{915EA95D-557B-4D70-9FE3-154A09E23164}"/>
     <dgm:cxn modelId="{A8BB997B-E537-4CEF-8302-DB0A198ED345}" type="presOf" srcId="{BB43531C-B7AE-4292-8377-3162933DAFBA}" destId="{6B3EDA9E-0592-4E80-B4BE-DC616318B899}" srcOrd="0" destOrd="0" presId="urn:microsoft.com/office/officeart/2005/8/layout/cycle3"/>
     <dgm:cxn modelId="{E80C7A7D-B49C-4474-8EE3-9F0B8A695A15}" srcId="{7290AEC5-FAB8-4940-8DD7-508E775CDCAA}" destId="{6009AE24-0B13-4C40-A1F7-8DB34D4C3A6C}" srcOrd="0" destOrd="0" parTransId="{A1A4FFCC-5D60-452C-8206-E1BBBC819D09}" sibTransId="{526D7B69-C369-423F-BB0A-DB58A0C63A55}"/>
+    <dgm:cxn modelId="{4C23EC7F-C6CB-4CB6-A3F1-A3EDE6BEFDB5}" srcId="{7290AEC5-FAB8-4940-8DD7-508E775CDCAA}" destId="{52D4706D-3A0A-43F5-9E47-5EF793ED9237}" srcOrd="1" destOrd="0" parTransId="{B7B27AC5-C29B-49F8-AE8C-9A3BDC659FB7}" sibTransId="{A4E865A7-4007-4C99-996C-9B655B5C73FD}"/>
     <dgm:cxn modelId="{668C9090-550C-4380-AA5B-3D5543291385}" type="presOf" srcId="{0916F887-07BA-4D88-8C61-F5E1C74BB133}" destId="{09DB80C8-EDE9-4E32-BB90-FE4109A4A4E5}" srcOrd="0" destOrd="0" presId="urn:microsoft.com/office/officeart/2005/8/layout/cycle3"/>
     <dgm:cxn modelId="{427D3C94-F315-4452-9758-6DB54785E7C8}" type="presOf" srcId="{D3C9EFAB-9817-442E-95E7-F2323EBA5AF0}" destId="{2C735144-22D5-438C-98AD-2B7E25E42FDF}" srcOrd="0" destOrd="2" presId="urn:microsoft.com/office/officeart/2005/8/layout/cycle3"/>
     <dgm:cxn modelId="{A033F995-8368-4648-B9EE-B8C5A71355C9}" srcId="{BB43531C-B7AE-4292-8377-3162933DAFBA}" destId="{7290AEC5-FAB8-4940-8DD7-508E775CDCAA}" srcOrd="2" destOrd="0" parTransId="{23A98D8A-C882-49D7-85B4-ABEE06D2A762}" sibTransId="{EC012DAA-5134-4630-9D6E-41F8C72359C3}"/>
@@ -1762,7 +1786,7 @@
     <dgm:cxn modelId="{049E89A5-9B2D-4CB4-B030-A559C7A2C468}" srcId="{348800AA-BF93-4470-A735-73956D24AE18}" destId="{65E308E4-7AA2-48B8-94EA-F0A45130561F}" srcOrd="1" destOrd="0" parTransId="{CB65EC59-A0A6-4A31-80B5-99A62F9454EF}" sibTransId="{79ACC14F-515F-4E98-94B6-E6D2F9FC94D1}"/>
     <dgm:cxn modelId="{BF9A23AA-F1E1-426E-8657-5BC1DB3B251D}" type="presOf" srcId="{E1DBEAA1-1931-4A3B-B55B-BF97366FF0F6}" destId="{947E9CA5-B5DD-45AE-9C7E-69C5B5579D69}" srcOrd="0" destOrd="3" presId="urn:microsoft.com/office/officeart/2005/8/layout/cycle3"/>
     <dgm:cxn modelId="{7B3A6BAC-1914-4C11-8274-D2FCD4A11E99}" srcId="{348800AA-BF93-4470-A735-73956D24AE18}" destId="{87A15763-626D-4CD0-9A54-D6C03AE5E0EE}" srcOrd="0" destOrd="0" parTransId="{0771DA80-2389-4F66-B502-AA419676A923}" sibTransId="{283618C2-FD57-4FE1-AD50-11F0A3C97AA2}"/>
-    <dgm:cxn modelId="{C336C7B0-A450-48D3-BB69-3F0B0019AC36}" type="presOf" srcId="{C3BDA8CC-8EFB-409C-BABB-7E444545CE7F}" destId="{4CA1D32F-63F3-4A49-BAC9-338CDA266B1B}" srcOrd="0" destOrd="2" presId="urn:microsoft.com/office/officeart/2005/8/layout/cycle3"/>
+    <dgm:cxn modelId="{C336C7B0-A450-48D3-BB69-3F0B0019AC36}" type="presOf" srcId="{C3BDA8CC-8EFB-409C-BABB-7E444545CE7F}" destId="{4CA1D32F-63F3-4A49-BAC9-338CDA266B1B}" srcOrd="0" destOrd="3" presId="urn:microsoft.com/office/officeart/2005/8/layout/cycle3"/>
     <dgm:cxn modelId="{564FE0B8-4EBD-4874-979A-EED721BB2FE2}" srcId="{572591BB-86FD-4B12-B04F-F5C37BC503F7}" destId="{8D1D87CD-3760-42F8-B2C0-0C3ACAA1AC14}" srcOrd="0" destOrd="0" parTransId="{278F09C1-FEA4-4CF4-9F16-B0BF459C0B01}" sibTransId="{B376545A-B8BD-4163-946D-CEDB8E325BE6}"/>
     <dgm:cxn modelId="{97787FC2-921C-44F3-8E73-A4BBB9BFA9DC}" type="presOf" srcId="{E9743155-07A6-4D09-A6D8-7015394183C5}" destId="{2C735144-22D5-438C-98AD-2B7E25E42FDF}" srcOrd="0" destOrd="1" presId="urn:microsoft.com/office/officeart/2005/8/layout/cycle3"/>
     <dgm:cxn modelId="{8DF2DAC6-56D8-4837-9A65-15224C8D6821}" srcId="{BB43531C-B7AE-4292-8377-3162933DAFBA}" destId="{572591BB-86FD-4B12-B04F-F5C37BC503F7}" srcOrd="1" destOrd="0" parTransId="{DE753E92-7FBE-482F-B47F-68F93998CF8F}" sibTransId="{9107338B-5F66-40B9-A00E-8726174DEBC1}"/>
@@ -1985,7 +2009,7 @@
           </a:pPr>
           <a:r>
             <a:rPr lang="en-US" sz="800" kern="1200" dirty="0"/>
-            <a:t>Program Lead coordinates survey, analysis and experimentation funding activities for a region</a:t>
+            <a:t>Program Lead coordinates survey, analysis and funding for a region</a:t>
           </a:r>
         </a:p>
       </dsp:txBody>
@@ -2098,7 +2122,7 @@
           </a:pPr>
           <a:r>
             <a:rPr lang="en-US" sz="800" kern="1200" dirty="0"/>
-            <a:t>Qualitative survey of teachers, students, school administrators by Citizen science volunteers</a:t>
+            <a:t>Quantitative survey of teachers, students, school administrators by Citizen science volunteers</a:t>
           </a:r>
         </a:p>
         <a:p>
@@ -2247,7 +2271,25 @@
           </a:pPr>
           <a:r>
             <a:rPr lang="en-US" sz="800" kern="1200" dirty="0"/>
-            <a:t>Program Lead coordinates survey, analysis and experimentation funding activities for a region</a:t>
+            <a:t>Run A/B experiment on multiple schools changing one of the factors such as toilet availability </a:t>
+          </a:r>
+        </a:p>
+        <a:p>
+          <a:pPr marL="57150" lvl="1" indent="-57150" algn="l" defTabSz="355600">
+            <a:lnSpc>
+              <a:spcPct val="90000"/>
+            </a:lnSpc>
+            <a:spcBef>
+              <a:spcPct val="0"/>
+            </a:spcBef>
+            <a:spcAft>
+              <a:spcPct val="15000"/>
+            </a:spcAft>
+            <a:buChar char="•"/>
+          </a:pPr>
+          <a:r>
+            <a:rPr lang="en-US" sz="800" kern="1200" dirty="0"/>
+            <a:t>Program Lead coordinates experimentation and funding activities for a region</a:t>
           </a:r>
         </a:p>
       </dsp:txBody>
@@ -3892,7 +3934,7 @@
           <a:p>
             <a:fld id="{B5FB05D9-47D1-4EFA-8EA9-DB6ADD83AD2F}" type="datetimeFigureOut">
               <a:rPr lang="en-US" smtClean="0"/>
-              <a:t>6/8/2019</a:t>
+              <a:t>6/9/2019</a:t>
             </a:fld>
             <a:endParaRPr lang="en-US"/>
           </a:p>
@@ -4427,7 +4469,7 @@
           <a:p>
             <a:fld id="{DA9272B4-7553-4446-919C-DDAC3A89012F}" type="datetimeFigureOut">
               <a:rPr lang="en-US" smtClean="0"/>
-              <a:t>6/8/2019</a:t>
+              <a:t>6/9/2019</a:t>
             </a:fld>
             <a:endParaRPr lang="en-US"/>
           </a:p>
@@ -4596,7 +4638,7 @@
           <a:p>
             <a:fld id="{DA9272B4-7553-4446-919C-DDAC3A89012F}" type="datetimeFigureOut">
               <a:rPr lang="en-US" smtClean="0"/>
-              <a:t>6/8/2019</a:t>
+              <a:t>6/9/2019</a:t>
             </a:fld>
             <a:endParaRPr lang="en-US"/>
           </a:p>
@@ -4775,7 +4817,7 @@
           <a:p>
             <a:fld id="{DA9272B4-7553-4446-919C-DDAC3A89012F}" type="datetimeFigureOut">
               <a:rPr lang="en-US" smtClean="0"/>
-              <a:t>6/8/2019</a:t>
+              <a:t>6/9/2019</a:t>
             </a:fld>
             <a:endParaRPr lang="en-US"/>
           </a:p>
@@ -4944,7 +4986,7 @@
           <a:p>
             <a:fld id="{DA9272B4-7553-4446-919C-DDAC3A89012F}" type="datetimeFigureOut">
               <a:rPr lang="en-US" smtClean="0"/>
-              <a:t>6/8/2019</a:t>
+              <a:t>6/9/2019</a:t>
             </a:fld>
             <a:endParaRPr lang="en-US"/>
           </a:p>
@@ -5190,7 +5232,7 @@
           <a:p>
             <a:fld id="{DA9272B4-7553-4446-919C-DDAC3A89012F}" type="datetimeFigureOut">
               <a:rPr lang="en-US" smtClean="0"/>
-              <a:t>6/8/2019</a:t>
+              <a:t>6/9/2019</a:t>
             </a:fld>
             <a:endParaRPr lang="en-US"/>
           </a:p>
@@ -5476,7 +5518,7 @@
           <a:p>
             <a:fld id="{DA9272B4-7553-4446-919C-DDAC3A89012F}" type="datetimeFigureOut">
               <a:rPr lang="en-US" smtClean="0"/>
-              <a:t>6/8/2019</a:t>
+              <a:t>6/9/2019</a:t>
             </a:fld>
             <a:endParaRPr lang="en-US"/>
           </a:p>
@@ -5896,7 +5938,7 @@
           <a:p>
             <a:fld id="{DA9272B4-7553-4446-919C-DDAC3A89012F}" type="datetimeFigureOut">
               <a:rPr lang="en-US" smtClean="0"/>
-              <a:t>6/8/2019</a:t>
+              <a:t>6/9/2019</a:t>
             </a:fld>
             <a:endParaRPr lang="en-US"/>
           </a:p>
@@ -6014,7 +6056,7 @@
           <a:p>
             <a:fld id="{DA9272B4-7553-4446-919C-DDAC3A89012F}" type="datetimeFigureOut">
               <a:rPr lang="en-US" smtClean="0"/>
-              <a:t>6/8/2019</a:t>
+              <a:t>6/9/2019</a:t>
             </a:fld>
             <a:endParaRPr lang="en-US"/>
           </a:p>
@@ -6110,7 +6152,7 @@
           <a:p>
             <a:fld id="{DA9272B4-7553-4446-919C-DDAC3A89012F}" type="datetimeFigureOut">
               <a:rPr lang="en-US" smtClean="0"/>
-              <a:t>6/8/2019</a:t>
+              <a:t>6/9/2019</a:t>
             </a:fld>
             <a:endParaRPr lang="en-US"/>
           </a:p>
@@ -6386,7 +6428,7 @@
           <a:p>
             <a:fld id="{DA9272B4-7553-4446-919C-DDAC3A89012F}" type="datetimeFigureOut">
               <a:rPr lang="en-US" smtClean="0"/>
-              <a:t>6/8/2019</a:t>
+              <a:t>6/9/2019</a:t>
             </a:fld>
             <a:endParaRPr lang="en-US"/>
           </a:p>
@@ -6639,7 +6681,7 @@
           <a:p>
             <a:fld id="{DA9272B4-7553-4446-919C-DDAC3A89012F}" type="datetimeFigureOut">
               <a:rPr lang="en-US" smtClean="0"/>
-              <a:t>6/8/2019</a:t>
+              <a:t>6/9/2019</a:t>
             </a:fld>
             <a:endParaRPr lang="en-US"/>
           </a:p>
@@ -6851,7 +6893,7 @@
           <a:p>
             <a:fld id="{DA9272B4-7553-4446-919C-DDAC3A89012F}" type="datetimeFigureOut">
               <a:rPr lang="en-US" smtClean="0"/>
-              <a:t>6/8/2019</a:t>
+              <a:t>6/9/2019</a:t>
             </a:fld>
             <a:endParaRPr lang="en-US"/>
           </a:p>
@@ -8984,7 +9026,7 @@
           <p:nvPr>
             <p:extLst>
               <p:ext uri="{D42A27DB-BD31-4B8C-83A1-F6EECF244321}">
-                <p14:modId xmlns:p14="http://schemas.microsoft.com/office/powerpoint/2010/main" val="2277418681"/>
+                <p14:modId xmlns:p14="http://schemas.microsoft.com/office/powerpoint/2010/main" val="1536270611"/>
               </p:ext>
             </p:extLst>
           </p:nvPr>

</xml_diff>